<commit_message>
Arquivos prontos para entrega
</commit_message>
<xml_diff>
--- a/15- Arquitetura de Negócio para cada Cenário .pptx
+++ b/15- Arquitetura de Negócio para cada Cenário .pptx
@@ -10988,7 +10988,7 @@
                 <a:cs typeface="Times New Roman" panose="02020603050405020304" pitchFamily="18" charset="0"/>
                 <a:sym typeface="Arial"/>
               </a:rPr>
-              <a:t>Vender produtos</a:t>
+              <a:t>Vender produtos prontos</a:t>
             </a:r>
           </a:p>
         </p:txBody>
@@ -13244,7 +13244,7 @@
                 <a:cs typeface="Times New Roman"/>
                 <a:sym typeface="Times New Roman"/>
               </a:rPr>
-              <a:t>-  Vender produtos</a:t>
+              <a:t>-  Vender produtos prontos</a:t>
             </a:r>
           </a:p>
         </p:txBody>

</xml_diff>